<commit_message>
Added filter functionality + minor bugfixes
</commit_message>
<xml_diff>
--- a/21-fs-ias-lec/groups/12-blocklist/presentation/Blocklisten2.pptx
+++ b/21-fs-ias-lec/groups/12-blocklist/presentation/Blocklisten2.pptx
@@ -6,9 +6,11 @@
   </p:sldMasterIdLst>
   <p:sldIdLst>
     <p:sldId id="256" r:id="rId2"/>
-    <p:sldId id="257" r:id="rId3"/>
-    <p:sldId id="259" r:id="rId4"/>
-    <p:sldId id="260" r:id="rId5"/>
+    <p:sldId id="261" r:id="rId3"/>
+    <p:sldId id="257" r:id="rId4"/>
+    <p:sldId id="259" r:id="rId5"/>
+    <p:sldId id="262" r:id="rId6"/>
+    <p:sldId id="260" r:id="rId7"/>
   </p:sldIdLst>
   <p:sldSz cx="12192000" cy="6858000"/>
   <p:notesSz cx="6858000" cy="9144000"/>
@@ -262,7 +264,7 @@
           <a:p>
             <a:fld id="{03CA219D-8EA6-43EC-A65A-E60B33D09F96}" type="datetimeFigureOut">
               <a:rPr lang="de-DE" smtClean="0"/>
-              <a:t>31.05.2021</a:t>
+              <a:t>01.06.2021</a:t>
             </a:fld>
             <a:endParaRPr lang="de-DE"/>
           </a:p>
@@ -460,7 +462,7 @@
           <a:p>
             <a:fld id="{03CA219D-8EA6-43EC-A65A-E60B33D09F96}" type="datetimeFigureOut">
               <a:rPr lang="de-DE" smtClean="0"/>
-              <a:t>31.05.2021</a:t>
+              <a:t>01.06.2021</a:t>
             </a:fld>
             <a:endParaRPr lang="de-DE"/>
           </a:p>
@@ -668,7 +670,7 @@
           <a:p>
             <a:fld id="{03CA219D-8EA6-43EC-A65A-E60B33D09F96}" type="datetimeFigureOut">
               <a:rPr lang="de-DE" smtClean="0"/>
-              <a:t>31.05.2021</a:t>
+              <a:t>01.06.2021</a:t>
             </a:fld>
             <a:endParaRPr lang="de-DE"/>
           </a:p>
@@ -866,7 +868,7 @@
           <a:p>
             <a:fld id="{03CA219D-8EA6-43EC-A65A-E60B33D09F96}" type="datetimeFigureOut">
               <a:rPr lang="de-DE" smtClean="0"/>
-              <a:t>31.05.2021</a:t>
+              <a:t>01.06.2021</a:t>
             </a:fld>
             <a:endParaRPr lang="de-DE"/>
           </a:p>
@@ -1141,7 +1143,7 @@
           <a:p>
             <a:fld id="{03CA219D-8EA6-43EC-A65A-E60B33D09F96}" type="datetimeFigureOut">
               <a:rPr lang="de-DE" smtClean="0"/>
-              <a:t>31.05.2021</a:t>
+              <a:t>01.06.2021</a:t>
             </a:fld>
             <a:endParaRPr lang="de-DE"/>
           </a:p>
@@ -1406,7 +1408,7 @@
           <a:p>
             <a:fld id="{03CA219D-8EA6-43EC-A65A-E60B33D09F96}" type="datetimeFigureOut">
               <a:rPr lang="de-DE" smtClean="0"/>
-              <a:t>31.05.2021</a:t>
+              <a:t>01.06.2021</a:t>
             </a:fld>
             <a:endParaRPr lang="de-DE"/>
           </a:p>
@@ -1818,7 +1820,7 @@
           <a:p>
             <a:fld id="{03CA219D-8EA6-43EC-A65A-E60B33D09F96}" type="datetimeFigureOut">
               <a:rPr lang="de-DE" smtClean="0"/>
-              <a:t>31.05.2021</a:t>
+              <a:t>01.06.2021</a:t>
             </a:fld>
             <a:endParaRPr lang="de-DE"/>
           </a:p>
@@ -1959,7 +1961,7 @@
           <a:p>
             <a:fld id="{03CA219D-8EA6-43EC-A65A-E60B33D09F96}" type="datetimeFigureOut">
               <a:rPr lang="de-DE" smtClean="0"/>
-              <a:t>31.05.2021</a:t>
+              <a:t>01.06.2021</a:t>
             </a:fld>
             <a:endParaRPr lang="de-DE"/>
           </a:p>
@@ -2072,7 +2074,7 @@
           <a:p>
             <a:fld id="{03CA219D-8EA6-43EC-A65A-E60B33D09F96}" type="datetimeFigureOut">
               <a:rPr lang="de-DE" smtClean="0"/>
-              <a:t>31.05.2021</a:t>
+              <a:t>01.06.2021</a:t>
             </a:fld>
             <a:endParaRPr lang="de-DE"/>
           </a:p>
@@ -2383,7 +2385,7 @@
           <a:p>
             <a:fld id="{03CA219D-8EA6-43EC-A65A-E60B33D09F96}" type="datetimeFigureOut">
               <a:rPr lang="de-DE" smtClean="0"/>
-              <a:t>31.05.2021</a:t>
+              <a:t>01.06.2021</a:t>
             </a:fld>
             <a:endParaRPr lang="de-DE"/>
           </a:p>
@@ -2671,7 +2673,7 @@
           <a:p>
             <a:fld id="{03CA219D-8EA6-43EC-A65A-E60B33D09F96}" type="datetimeFigureOut">
               <a:rPr lang="de-DE" smtClean="0"/>
-              <a:t>31.05.2021</a:t>
+              <a:t>01.06.2021</a:t>
             </a:fld>
             <a:endParaRPr lang="de-DE"/>
           </a:p>
@@ -2912,7 +2914,7 @@
           <a:p>
             <a:fld id="{03CA219D-8EA6-43EC-A65A-E60B33D09F96}" type="datetimeFigureOut">
               <a:rPr lang="de-DE" smtClean="0"/>
-              <a:t>31.05.2021</a:t>
+              <a:t>01.06.2021</a:t>
             </a:fld>
             <a:endParaRPr lang="de-DE"/>
           </a:p>
@@ -3743,10 +3745,180 @@
       </p:sp>
       <p:sp>
         <p:nvSpPr>
-          <p:cNvPr id="9" name="Rechteck: abgerundete Ecken 8">
-            <a:extLst>
-              <a:ext uri="{FF2B5EF4-FFF2-40B4-BE49-F238E27FC236}">
-                <a16:creationId xmlns:a16="http://schemas.microsoft.com/office/drawing/2014/main" id="{FC72E339-1DD3-41EE-B88D-1796D7FE276E}"/>
+          <p:cNvPr id="3" name="Inhaltsplatzhalter 2">
+            <a:extLst>
+              <a:ext uri="{FF2B5EF4-FFF2-40B4-BE49-F238E27FC236}">
+                <a16:creationId xmlns:a16="http://schemas.microsoft.com/office/drawing/2014/main" id="{6BB2112C-CF06-4393-B374-9038D3ECE62D}"/>
+              </a:ext>
+            </a:extLst>
+          </p:cNvPr>
+          <p:cNvSpPr>
+            <a:spLocks noGrp="1"/>
+          </p:cNvSpPr>
+          <p:nvPr>
+            <p:ph idx="1"/>
+          </p:nvPr>
+        </p:nvSpPr>
+        <p:spPr>
+          <a:xfrm>
+            <a:off x="838200" y="1690688"/>
+            <a:ext cx="7143403" cy="4351338"/>
+          </a:xfrm>
+        </p:spPr>
+        <p:txBody>
+          <a:bodyPr/>
+          <a:lstStyle/>
+          <a:p>
+            <a:pPr marL="0" indent="0">
+              <a:buNone/>
+            </a:pPr>
+            <a:r>
+              <a:rPr lang="de-DE" dirty="0"/>
+              <a:t>- Word Blocking</a:t>
+            </a:r>
+          </a:p>
+          <a:p>
+            <a:pPr marL="0" indent="0">
+              <a:buNone/>
+            </a:pPr>
+            <a:r>
+              <a:rPr lang="de-DE" dirty="0"/>
+              <a:t>- </a:t>
+            </a:r>
+            <a:r>
+              <a:rPr lang="de-DE" dirty="0" err="1"/>
+              <a:t>Author</a:t>
+            </a:r>
+            <a:r>
+              <a:rPr lang="de-DE" dirty="0"/>
+              <a:t> Blocking</a:t>
+            </a:r>
+          </a:p>
+          <a:p>
+            <a:pPr marL="0" indent="0">
+              <a:buNone/>
+            </a:pPr>
+            <a:r>
+              <a:rPr lang="de-DE" dirty="0"/>
+              <a:t>- Blocklistenbearbeitung</a:t>
+            </a:r>
+          </a:p>
+          <a:p>
+            <a:pPr marL="0" indent="0">
+              <a:buNone/>
+            </a:pPr>
+            <a:r>
+              <a:rPr lang="de-DE" dirty="0"/>
+              <a:t>- Blocklisten teilen</a:t>
+            </a:r>
+          </a:p>
+          <a:p>
+            <a:pPr>
+              <a:buFontTx/>
+              <a:buChar char="-"/>
+            </a:pPr>
+            <a:r>
+              <a:rPr lang="de-DE" dirty="0"/>
+              <a:t>Kontrolle über Weiterverbreitung von Inhalten</a:t>
+            </a:r>
+          </a:p>
+          <a:p>
+            <a:pPr>
+              <a:buFontTx/>
+              <a:buChar char="-"/>
+            </a:pPr>
+            <a:r>
+              <a:rPr lang="de-DE" dirty="0"/>
+              <a:t>Verschiedene Block-Einstellungen</a:t>
+            </a:r>
+            <a:endParaRPr lang="en-US" dirty="0"/>
+          </a:p>
+        </p:txBody>
+      </p:sp>
+      <p:sp>
+        <p:nvSpPr>
+          <p:cNvPr id="4" name="Textfeld 3">
+            <a:extLst>
+              <a:ext uri="{FF2B5EF4-FFF2-40B4-BE49-F238E27FC236}">
+                <a16:creationId xmlns:a16="http://schemas.microsoft.com/office/drawing/2014/main" id="{D0643970-3A43-47C6-86CF-E33D0A96C4C3}"/>
+              </a:ext>
+            </a:extLst>
+          </p:cNvPr>
+          <p:cNvSpPr txBox="1"/>
+          <p:nvPr/>
+        </p:nvSpPr>
+        <p:spPr>
+          <a:xfrm>
+            <a:off x="7048498" y="1851834"/>
+            <a:ext cx="2984963" cy="523220"/>
+          </a:xfrm>
+          <a:prstGeom prst="rect">
+            <a:avLst/>
+          </a:prstGeom>
+          <a:noFill/>
+        </p:spPr>
+        <p:txBody>
+          <a:bodyPr wrap="square" rtlCol="0">
+            <a:spAutoFit/>
+          </a:bodyPr>
+          <a:lstStyle/>
+          <a:p>
+            <a:r>
+              <a:rPr lang="en-US" sz="2800" dirty="0"/>
+              <a:t>“duck” </a:t>
+            </a:r>
+            <a:r>
+              <a:rPr lang="en-US" sz="2800" dirty="0">
+                <a:sym typeface="Wingdings" panose="05000000000000000000" pitchFamily="2" charset="2"/>
+              </a:rPr>
+              <a:t> “****”</a:t>
+            </a:r>
+            <a:endParaRPr lang="de-DE" sz="2800" dirty="0"/>
+          </a:p>
+        </p:txBody>
+      </p:sp>
+      <p:sp>
+        <p:nvSpPr>
+          <p:cNvPr id="5" name="Textfeld 4">
+            <a:extLst>
+              <a:ext uri="{FF2B5EF4-FFF2-40B4-BE49-F238E27FC236}">
+                <a16:creationId xmlns:a16="http://schemas.microsoft.com/office/drawing/2014/main" id="{2379A10D-AE6E-45B9-81B9-B25039C1DBBD}"/>
+              </a:ext>
+            </a:extLst>
+          </p:cNvPr>
+          <p:cNvSpPr txBox="1"/>
+          <p:nvPr/>
+        </p:nvSpPr>
+        <p:spPr>
+          <a:xfrm>
+            <a:off x="7048498" y="2492250"/>
+            <a:ext cx="3059778" cy="523220"/>
+          </a:xfrm>
+          <a:prstGeom prst="rect">
+            <a:avLst/>
+          </a:prstGeom>
+          <a:noFill/>
+        </p:spPr>
+        <p:txBody>
+          <a:bodyPr wrap="square" rtlCol="0">
+            <a:spAutoFit/>
+          </a:bodyPr>
+          <a:lstStyle/>
+          <a:p>
+            <a:r>
+              <a:rPr lang="en-US" sz="2800" dirty="0"/>
+              <a:t>Paul says :“hello”</a:t>
+            </a:r>
+            <a:endParaRPr lang="de-DE" sz="2800" dirty="0"/>
+          </a:p>
+        </p:txBody>
+      </p:sp>
+      <p:sp>
+        <p:nvSpPr>
+          <p:cNvPr id="6" name="Multiplikationszeichen 5">
+            <a:extLst>
+              <a:ext uri="{FF2B5EF4-FFF2-40B4-BE49-F238E27FC236}">
+                <a16:creationId xmlns:a16="http://schemas.microsoft.com/office/drawing/2014/main" id="{802494A4-C5F7-4DFD-8E70-D839879C69A5}"/>
               </a:ext>
             </a:extLst>
           </p:cNvPr>
@@ -3755,7 +3927,89 @@
         </p:nvSpPr>
         <p:spPr>
           <a:xfrm>
-            <a:off x="3447013" y="4687793"/>
+            <a:off x="8265622" y="2439664"/>
+            <a:ext cx="1767839" cy="628391"/>
+          </a:xfrm>
+          <a:prstGeom prst="mathMultiply">
+            <a:avLst/>
+          </a:prstGeom>
+          <a:solidFill>
+            <a:srgbClr val="FF0000"/>
+          </a:solidFill>
+          <a:ln>
+            <a:noFill/>
+          </a:ln>
+        </p:spPr>
+        <p:style>
+          <a:lnRef idx="2">
+            <a:schemeClr val="accent1">
+              <a:shade val="50000"/>
+            </a:schemeClr>
+          </a:lnRef>
+          <a:fillRef idx="1">
+            <a:schemeClr val="accent1"/>
+          </a:fillRef>
+          <a:effectRef idx="0">
+            <a:schemeClr val="accent1"/>
+          </a:effectRef>
+          <a:fontRef idx="minor">
+            <a:schemeClr val="lt1"/>
+          </a:fontRef>
+        </p:style>
+        <p:txBody>
+          <a:bodyPr rtlCol="0" anchor="ctr"/>
+          <a:lstStyle/>
+          <a:p>
+            <a:pPr algn="ctr"/>
+            <a:endParaRPr lang="de-DE"/>
+          </a:p>
+        </p:txBody>
+      </p:sp>
+    </p:spTree>
+    <p:extLst>
+      <p:ext uri="{BB962C8B-B14F-4D97-AF65-F5344CB8AC3E}">
+        <p14:creationId xmlns:p14="http://schemas.microsoft.com/office/powerpoint/2010/main" val="424124440"/>
+      </p:ext>
+    </p:extLst>
+  </p:cSld>
+  <p:clrMapOvr>
+    <a:masterClrMapping/>
+  </p:clrMapOvr>
+</p:sld>
+</file>
+
+<file path=ppt/slides/slide3.xml><?xml version="1.0" encoding="utf-8"?>
+<p:sld xmlns:a="http://schemas.openxmlformats.org/drawingml/2006/main" xmlns:r="http://schemas.openxmlformats.org/officeDocument/2006/relationships" xmlns:p="http://schemas.openxmlformats.org/presentationml/2006/main">
+  <p:cSld>
+    <p:spTree>
+      <p:nvGrpSpPr>
+        <p:cNvPr id="1" name=""/>
+        <p:cNvGrpSpPr/>
+        <p:nvPr/>
+      </p:nvGrpSpPr>
+      <p:grpSpPr>
+        <a:xfrm>
+          <a:off x="0" y="0"/>
+          <a:ext cx="0" cy="0"/>
+          <a:chOff x="0" y="0"/>
+          <a:chExt cx="0" cy="0"/>
+        </a:xfrm>
+      </p:grpSpPr>
+      <p:sp>
+        <p:nvSpPr>
+          <p:cNvPr id="9" name="Rechteck: abgerundete Ecken 8">
+            <a:extLst>
+              <a:ext uri="{FF2B5EF4-FFF2-40B4-BE49-F238E27FC236}">
+                <a16:creationId xmlns:a16="http://schemas.microsoft.com/office/drawing/2014/main" id="{FC72E339-1DD3-41EE-B88D-1796D7FE276E}"/>
+              </a:ext>
+            </a:extLst>
+          </p:cNvPr>
+          <p:cNvSpPr/>
+          <p:nvPr/>
+        </p:nvSpPr>
+        <p:spPr>
+          <a:xfrm>
+            <a:off x="3447013" y="4266685"/>
             <a:ext cx="1934093" cy="1325563"/>
           </a:xfrm>
           <a:prstGeom prst="roundRect">
@@ -3803,7 +4057,7 @@
         </p:nvSpPr>
         <p:spPr>
           <a:xfrm>
-            <a:off x="798025" y="4687793"/>
+            <a:off x="798025" y="4266685"/>
             <a:ext cx="1934093" cy="1325563"/>
           </a:xfrm>
           <a:prstGeom prst="roundRect">
@@ -3851,7 +4105,7 @@
         </p:nvSpPr>
         <p:spPr>
           <a:xfrm>
-            <a:off x="3447012" y="2895791"/>
+            <a:off x="3447012" y="2474683"/>
             <a:ext cx="1934093" cy="1325563"/>
           </a:xfrm>
           <a:prstGeom prst="roundRect">
@@ -3901,7 +4155,7 @@
         </p:nvSpPr>
         <p:spPr bwMode="auto">
           <a:xfrm>
-            <a:off x="3278602" y="1690688"/>
+            <a:off x="3278602" y="1269580"/>
             <a:ext cx="2270914" cy="738664"/>
           </a:xfrm>
           <a:prstGeom prst="rect">
@@ -4125,7 +4379,7 @@
         </p:nvCxnSpPr>
         <p:spPr>
           <a:xfrm>
-            <a:off x="4414059" y="2429352"/>
+            <a:off x="4414059" y="2008244"/>
             <a:ext cx="0" cy="466439"/>
           </a:xfrm>
           <a:prstGeom prst="straightConnector1">
@@ -4168,7 +4422,7 @@
         </p:nvCxnSpPr>
         <p:spPr>
           <a:xfrm>
-            <a:off x="4414059" y="4221354"/>
+            <a:off x="4414059" y="3800246"/>
             <a:ext cx="1" cy="466439"/>
           </a:xfrm>
           <a:prstGeom prst="straightConnector1">
@@ -4210,7 +4464,7 @@
         </p:nvCxnSpPr>
         <p:spPr>
           <a:xfrm>
-            <a:off x="2732118" y="5350575"/>
+            <a:off x="2732118" y="4929467"/>
             <a:ext cx="714895" cy="0"/>
           </a:xfrm>
           <a:prstGeom prst="straightConnector1">
@@ -4249,7 +4503,7 @@
         </p:nvSpPr>
         <p:spPr>
           <a:xfrm>
-            <a:off x="6767714" y="2908868"/>
+            <a:off x="6767714" y="2487760"/>
             <a:ext cx="1934093" cy="1325563"/>
           </a:xfrm>
           <a:prstGeom prst="roundRect">
@@ -4302,7 +4556,7 @@
         </p:nvSpPr>
         <p:spPr bwMode="auto">
           <a:xfrm>
-            <a:off x="5927589" y="4981242"/>
+            <a:off x="5927589" y="4560134"/>
             <a:ext cx="3614344" cy="738664"/>
           </a:xfrm>
           <a:prstGeom prst="rect">
@@ -4566,7 +4820,7 @@
         </p:nvCxnSpPr>
         <p:spPr>
           <a:xfrm>
-            <a:off x="7734761" y="4234431"/>
+            <a:off x="7734761" y="3813323"/>
             <a:ext cx="0" cy="746811"/>
           </a:xfrm>
           <a:prstGeom prst="straightConnector1">
@@ -4608,7 +4862,7 @@
         </p:nvCxnSpPr>
         <p:spPr>
           <a:xfrm flipV="1">
-            <a:off x="5381106" y="5350574"/>
+            <a:off x="5381106" y="4929466"/>
             <a:ext cx="546483" cy="1"/>
           </a:xfrm>
           <a:prstGeom prst="straightConnector1">
@@ -4649,7 +4903,7 @@
         </p:nvSpPr>
         <p:spPr bwMode="auto">
           <a:xfrm>
-            <a:off x="629614" y="3310039"/>
+            <a:off x="629614" y="2888931"/>
             <a:ext cx="2270914" cy="523220"/>
           </a:xfrm>
           <a:prstGeom prst="rect">
@@ -4826,7 +5080,7 @@
         </p:nvCxnSpPr>
         <p:spPr>
           <a:xfrm>
-            <a:off x="1765071" y="3940981"/>
+            <a:off x="1765071" y="3519873"/>
             <a:ext cx="1" cy="746812"/>
           </a:xfrm>
           <a:prstGeom prst="straightConnector1">
@@ -4865,7 +5119,7 @@
         </p:nvSpPr>
         <p:spPr>
           <a:xfrm>
-            <a:off x="9961495" y="4687793"/>
+            <a:off x="9961495" y="4266685"/>
             <a:ext cx="1934093" cy="1325563"/>
           </a:xfrm>
           <a:prstGeom prst="roundRect">
@@ -4919,7 +5173,7 @@
         </p:nvCxnSpPr>
         <p:spPr>
           <a:xfrm>
-            <a:off x="9541933" y="5350574"/>
+            <a:off x="9541933" y="4929466"/>
             <a:ext cx="419562" cy="1"/>
           </a:xfrm>
           <a:prstGeom prst="straightConnector1">
@@ -4957,7 +5211,7 @@
 </p:sld>
 </file>
 
-<file path=ppt/slides/slide3.xml><?xml version="1.0" encoding="utf-8"?>
+<file path=ppt/slides/slide4.xml><?xml version="1.0" encoding="utf-8"?>
 <p:sld xmlns:a="http://schemas.openxmlformats.org/drawingml/2006/main" xmlns:r="http://schemas.openxmlformats.org/officeDocument/2006/relationships" xmlns:p="http://schemas.openxmlformats.org/presentationml/2006/main">
   <p:cSld>
     <p:spTree>
@@ -5447,7 +5701,210 @@
 </p:sld>
 </file>
 
-<file path=ppt/slides/slide4.xml><?xml version="1.0" encoding="utf-8"?>
+<file path=ppt/slides/slide5.xml><?xml version="1.0" encoding="utf-8"?>
+<p:sld xmlns:a="http://schemas.openxmlformats.org/drawingml/2006/main" xmlns:r="http://schemas.openxmlformats.org/officeDocument/2006/relationships" xmlns:p="http://schemas.openxmlformats.org/presentationml/2006/main">
+  <p:cSld>
+    <p:spTree>
+      <p:nvGrpSpPr>
+        <p:cNvPr id="1" name=""/>
+        <p:cNvGrpSpPr/>
+        <p:nvPr/>
+      </p:nvGrpSpPr>
+      <p:grpSpPr>
+        <a:xfrm>
+          <a:off x="0" y="0"/>
+          <a:ext cx="0" cy="0"/>
+          <a:chOff x="0" y="0"/>
+          <a:chExt cx="0" cy="0"/>
+        </a:xfrm>
+      </p:grpSpPr>
+      <p:sp>
+        <p:nvSpPr>
+          <p:cNvPr id="2" name="Titel 1">
+            <a:extLst>
+              <a:ext uri="{FF2B5EF4-FFF2-40B4-BE49-F238E27FC236}">
+                <a16:creationId xmlns:a16="http://schemas.microsoft.com/office/drawing/2014/main" id="{43F1C798-EB9C-4429-B00A-EC11DA68958D}"/>
+              </a:ext>
+            </a:extLst>
+          </p:cNvPr>
+          <p:cNvSpPr>
+            <a:spLocks noGrp="1"/>
+          </p:cNvSpPr>
+          <p:nvPr>
+            <p:ph type="title"/>
+          </p:nvPr>
+        </p:nvSpPr>
+        <p:spPr/>
+        <p:txBody>
+          <a:bodyPr/>
+          <a:lstStyle/>
+          <a:p>
+            <a:r>
+              <a:rPr lang="de-DE" dirty="0">
+                <a:latin typeface="Consolas" panose="020B0609020204030204" pitchFamily="49" charset="0"/>
+              </a:rPr>
+              <a:t>Ausblick:</a:t>
+            </a:r>
+          </a:p>
+        </p:txBody>
+      </p:sp>
+      <p:sp>
+        <p:nvSpPr>
+          <p:cNvPr id="4" name="Rechteck: abgerundete Ecken 3">
+            <a:extLst>
+              <a:ext uri="{FF2B5EF4-FFF2-40B4-BE49-F238E27FC236}">
+                <a16:creationId xmlns:a16="http://schemas.microsoft.com/office/drawing/2014/main" id="{0C55756C-4E49-4B30-BBD4-16723B8E91AC}"/>
+              </a:ext>
+            </a:extLst>
+          </p:cNvPr>
+          <p:cNvSpPr/>
+          <p:nvPr/>
+        </p:nvSpPr>
+        <p:spPr>
+          <a:xfrm>
+            <a:off x="3377961" y="2878303"/>
+            <a:ext cx="1934093" cy="1325563"/>
+          </a:xfrm>
+          <a:prstGeom prst="roundRect">
+            <a:avLst/>
+          </a:prstGeom>
+        </p:spPr>
+        <p:style>
+          <a:lnRef idx="3">
+            <a:schemeClr val="lt1"/>
+          </a:lnRef>
+          <a:fillRef idx="1">
+            <a:schemeClr val="dk1"/>
+          </a:fillRef>
+          <a:effectRef idx="1">
+            <a:schemeClr val="dk1"/>
+          </a:effectRef>
+          <a:fontRef idx="minor">
+            <a:schemeClr val="lt1"/>
+          </a:fontRef>
+        </p:style>
+        <p:txBody>
+          <a:bodyPr rtlCol="0" anchor="ctr"/>
+          <a:lstStyle/>
+          <a:p>
+            <a:pPr algn="ctr"/>
+            <a:r>
+              <a:rPr lang="en-US" dirty="0"/>
+              <a:t>BACnet Application</a:t>
+            </a:r>
+            <a:endParaRPr lang="de-DE" dirty="0"/>
+          </a:p>
+        </p:txBody>
+      </p:sp>
+      <p:sp>
+        <p:nvSpPr>
+          <p:cNvPr id="5" name="Rechteck: abgerundete Ecken 4">
+            <a:extLst>
+              <a:ext uri="{FF2B5EF4-FFF2-40B4-BE49-F238E27FC236}">
+                <a16:creationId xmlns:a16="http://schemas.microsoft.com/office/drawing/2014/main" id="{0A463429-ECA2-4CD6-83D0-C4355E07E2B8}"/>
+              </a:ext>
+            </a:extLst>
+          </p:cNvPr>
+          <p:cNvSpPr/>
+          <p:nvPr/>
+        </p:nvSpPr>
+        <p:spPr>
+          <a:xfrm>
+            <a:off x="6155723" y="2878304"/>
+            <a:ext cx="1934093" cy="1325563"/>
+          </a:xfrm>
+          <a:prstGeom prst="roundRect">
+            <a:avLst/>
+          </a:prstGeom>
+          <a:solidFill>
+            <a:srgbClr val="FF0000"/>
+          </a:solidFill>
+        </p:spPr>
+        <p:style>
+          <a:lnRef idx="3">
+            <a:schemeClr val="lt1"/>
+          </a:lnRef>
+          <a:fillRef idx="1">
+            <a:schemeClr val="accent2"/>
+          </a:fillRef>
+          <a:effectRef idx="1">
+            <a:schemeClr val="accent2"/>
+          </a:effectRef>
+          <a:fontRef idx="minor">
+            <a:schemeClr val="lt1"/>
+          </a:fontRef>
+        </p:style>
+        <p:txBody>
+          <a:bodyPr rtlCol="0" anchor="ctr"/>
+          <a:lstStyle/>
+          <a:p>
+            <a:pPr algn="ctr"/>
+            <a:r>
+              <a:rPr lang="en-US" dirty="0"/>
+              <a:t>Blocklist Library</a:t>
+            </a:r>
+            <a:endParaRPr lang="de-DE" dirty="0"/>
+          </a:p>
+        </p:txBody>
+      </p:sp>
+      <p:cxnSp>
+        <p:nvCxnSpPr>
+          <p:cNvPr id="6" name="Gerade Verbindung mit Pfeil 5">
+            <a:extLst>
+              <a:ext uri="{FF2B5EF4-FFF2-40B4-BE49-F238E27FC236}">
+                <a16:creationId xmlns:a16="http://schemas.microsoft.com/office/drawing/2014/main" id="{09A362F3-F2A7-4B0A-804A-1AD890E05DBF}"/>
+              </a:ext>
+            </a:extLst>
+          </p:cNvPr>
+          <p:cNvCxnSpPr>
+            <a:cxnSpLocks/>
+            <a:stCxn id="4" idx="3"/>
+            <a:endCxn id="5" idx="1"/>
+          </p:cNvCxnSpPr>
+          <p:nvPr/>
+        </p:nvCxnSpPr>
+        <p:spPr>
+          <a:xfrm>
+            <a:off x="5312054" y="3541085"/>
+            <a:ext cx="843669" cy="1"/>
+          </a:xfrm>
+          <a:prstGeom prst="straightConnector1">
+            <a:avLst/>
+          </a:prstGeom>
+          <a:ln>
+            <a:headEnd type="arrow" w="med" len="med"/>
+            <a:tailEnd type="arrow" w="med" len="med"/>
+          </a:ln>
+        </p:spPr>
+        <p:style>
+          <a:lnRef idx="3">
+            <a:schemeClr val="dk1"/>
+          </a:lnRef>
+          <a:fillRef idx="0">
+            <a:schemeClr val="dk1"/>
+          </a:fillRef>
+          <a:effectRef idx="2">
+            <a:schemeClr val="dk1"/>
+          </a:effectRef>
+          <a:fontRef idx="minor">
+            <a:schemeClr val="tx1"/>
+          </a:fontRef>
+        </p:style>
+      </p:cxnSp>
+    </p:spTree>
+    <p:extLst>
+      <p:ext uri="{BB962C8B-B14F-4D97-AF65-F5344CB8AC3E}">
+        <p14:creationId xmlns:p14="http://schemas.microsoft.com/office/powerpoint/2010/main" val="2837852345"/>
+      </p:ext>
+    </p:extLst>
+  </p:cSld>
+  <p:clrMapOvr>
+    <a:masterClrMapping/>
+  </p:clrMapOvr>
+</p:sld>
+</file>
+
+<file path=ppt/slides/slide6.xml><?xml version="1.0" encoding="utf-8"?>
 <p:sld xmlns:a="http://schemas.openxmlformats.org/drawingml/2006/main" xmlns:r="http://schemas.openxmlformats.org/officeDocument/2006/relationships" xmlns:p="http://schemas.openxmlformats.org/presentationml/2006/main">
   <p:cSld>
     <p:spTree>

</xml_diff>